<commit_message>
Updated citation content & formatting
</commit_message>
<xml_diff>
--- a/Suresh_CBA_Presentation.pptx
+++ b/Suresh_CBA_Presentation.pptx
@@ -221,7 +221,7 @@
           <a:p>
             <a:fld id="{11E4EDAD-C4B7-5240-8D3F-3A8319E4B407}" type="datetimeFigureOut">
               <a:rPr lang="en-US" smtClean="0"/>
-              <a:t>7/20/17</a:t>
+              <a:t>7/21/17</a:t>
             </a:fld>
             <a:endParaRPr lang="en-US"/>
           </a:p>
@@ -1820,7 +1820,7 @@
           <a:p>
             <a:fld id="{56FBD073-38E3-F34D-B264-54811450B35A}" type="datetimeFigureOut">
               <a:rPr lang="en-US" smtClean="0"/>
-              <a:t>7/20/17</a:t>
+              <a:t>7/21/17</a:t>
             </a:fld>
             <a:endParaRPr lang="en-US"/>
           </a:p>
@@ -1990,7 +1990,7 @@
           <a:p>
             <a:fld id="{56FBD073-38E3-F34D-B264-54811450B35A}" type="datetimeFigureOut">
               <a:rPr lang="en-US" smtClean="0"/>
-              <a:t>7/20/17</a:t>
+              <a:t>7/21/17</a:t>
             </a:fld>
             <a:endParaRPr lang="en-US"/>
           </a:p>
@@ -2170,7 +2170,7 @@
           <a:p>
             <a:fld id="{56FBD073-38E3-F34D-B264-54811450B35A}" type="datetimeFigureOut">
               <a:rPr lang="en-US" smtClean="0"/>
-              <a:t>7/20/17</a:t>
+              <a:t>7/21/17</a:t>
             </a:fld>
             <a:endParaRPr lang="en-US"/>
           </a:p>
@@ -2340,7 +2340,7 @@
           <a:p>
             <a:fld id="{56FBD073-38E3-F34D-B264-54811450B35A}" type="datetimeFigureOut">
               <a:rPr lang="en-US" smtClean="0"/>
-              <a:t>7/20/17</a:t>
+              <a:t>7/21/17</a:t>
             </a:fld>
             <a:endParaRPr lang="en-US"/>
           </a:p>
@@ -2586,7 +2586,7 @@
           <a:p>
             <a:fld id="{56FBD073-38E3-F34D-B264-54811450B35A}" type="datetimeFigureOut">
               <a:rPr lang="en-US" smtClean="0"/>
-              <a:t>7/20/17</a:t>
+              <a:t>7/21/17</a:t>
             </a:fld>
             <a:endParaRPr lang="en-US"/>
           </a:p>
@@ -2818,7 +2818,7 @@
           <a:p>
             <a:fld id="{56FBD073-38E3-F34D-B264-54811450B35A}" type="datetimeFigureOut">
               <a:rPr lang="en-US" smtClean="0"/>
-              <a:t>7/20/17</a:t>
+              <a:t>7/21/17</a:t>
             </a:fld>
             <a:endParaRPr lang="en-US"/>
           </a:p>
@@ -3185,7 +3185,7 @@
           <a:p>
             <a:fld id="{56FBD073-38E3-F34D-B264-54811450B35A}" type="datetimeFigureOut">
               <a:rPr lang="en-US" smtClean="0"/>
-              <a:t>7/20/17</a:t>
+              <a:t>7/21/17</a:t>
             </a:fld>
             <a:endParaRPr lang="en-US"/>
           </a:p>
@@ -3303,7 +3303,7 @@
           <a:p>
             <a:fld id="{56FBD073-38E3-F34D-B264-54811450B35A}" type="datetimeFigureOut">
               <a:rPr lang="en-US" smtClean="0"/>
-              <a:t>7/20/17</a:t>
+              <a:t>7/21/17</a:t>
             </a:fld>
             <a:endParaRPr lang="en-US"/>
           </a:p>
@@ -3398,7 +3398,7 @@
           <a:p>
             <a:fld id="{56FBD073-38E3-F34D-B264-54811450B35A}" type="datetimeFigureOut">
               <a:rPr lang="en-US" smtClean="0"/>
-              <a:t>7/20/17</a:t>
+              <a:t>7/21/17</a:t>
             </a:fld>
             <a:endParaRPr lang="en-US"/>
           </a:p>
@@ -3675,7 +3675,7 @@
           <a:p>
             <a:fld id="{56FBD073-38E3-F34D-B264-54811450B35A}" type="datetimeFigureOut">
               <a:rPr lang="en-US" smtClean="0"/>
-              <a:t>7/20/17</a:t>
+              <a:t>7/21/17</a:t>
             </a:fld>
             <a:endParaRPr lang="en-US"/>
           </a:p>
@@ -3928,7 +3928,7 @@
           <a:p>
             <a:fld id="{56FBD073-38E3-F34D-B264-54811450B35A}" type="datetimeFigureOut">
               <a:rPr lang="en-US" smtClean="0"/>
-              <a:t>7/20/17</a:t>
+              <a:t>7/21/17</a:t>
             </a:fld>
             <a:endParaRPr lang="en-US"/>
           </a:p>
@@ -4141,7 +4141,7 @@
           <a:p>
             <a:fld id="{56FBD073-38E3-F34D-B264-54811450B35A}" type="datetimeFigureOut">
               <a:rPr lang="en-US" smtClean="0"/>
-              <a:t>7/20/17</a:t>
+              <a:t>7/21/17</a:t>
             </a:fld>
             <a:endParaRPr lang="en-US"/>
           </a:p>
@@ -4615,6 +4615,13 @@
   <p:clrMapOvr>
     <a:masterClrMapping/>
   </p:clrMapOvr>
+  <p:timing>
+    <p:tnLst>
+      <p:par>
+        <p:cTn id="1" dur="indefinite" restart="never" nodeType="tmRoot"/>
+      </p:par>
+    </p:tnLst>
+  </p:timing>
 </p:sld>
 </file>
 
@@ -4677,11 +4684,7 @@
           <a:p>
             <a:r>
               <a:rPr lang="en-US" dirty="0" smtClean="0"/>
-              <a:t>CB decides whether to bail out distressed banks according to a logistic objective function</a:t>
-            </a:r>
-            <a:r>
-              <a:rPr lang="en-US" dirty="0" smtClean="0"/>
-              <a:t>:</a:t>
+              <a:t>CB decides whether to bail out distressed banks according to a logistic objective function:</a:t>
             </a:r>
           </a:p>
           <a:p>
@@ -4725,11 +4728,7 @@
             </a:r>
             <a:r>
               <a:rPr lang="en-US" dirty="0" smtClean="0"/>
-              <a:t> (systemic risk) = represented by correlation of </a:t>
-            </a:r>
-            <a:r>
-              <a:rPr lang="en-US" dirty="0" smtClean="0"/>
-              <a:t>assets</a:t>
+              <a:t> (systemic risk) = represented by correlation of assets</a:t>
             </a:r>
             <a:r>
               <a:rPr lang="en-US" baseline="30000" dirty="0" smtClean="0"/>
@@ -5713,11 +5712,7 @@
           <a:p>
             <a:r>
               <a:rPr lang="en-US" dirty="0" smtClean="0"/>
-              <a:t>Investment risk is defined as the proportion of banks expected to choose each package multiplied by the volatility of that </a:t>
-            </a:r>
-            <a:r>
-              <a:rPr lang="en-US" dirty="0" smtClean="0"/>
-              <a:t>package</a:t>
+              <a:t>Investment risk is defined as the proportion of banks expected to choose each package multiplied by the volatility of that package</a:t>
             </a:r>
             <a:r>
               <a:rPr lang="en-US" baseline="30000" dirty="0"/>
@@ -6124,11 +6119,7 @@
           <a:p>
             <a:r>
               <a:rPr lang="en-US" dirty="0" smtClean="0"/>
-              <a:t>Optimal policy defined as minimizing total risk (combination of systemic and investment </a:t>
-            </a:r>
-            <a:r>
-              <a:rPr lang="en-US" dirty="0" smtClean="0"/>
-              <a:t>risk)</a:t>
+              <a:t>Optimal policy defined as minimizing total risk (combination of systemic and investment risk)</a:t>
             </a:r>
             <a:r>
               <a:rPr lang="en-US" baseline="30000" dirty="0" smtClean="0"/>
@@ -7336,6 +7327,13 @@
   <p:clrMapOvr>
     <a:masterClrMapping/>
   </p:clrMapOvr>
+  <p:timing>
+    <p:tnLst>
+      <p:par>
+        <p:cTn id="1" dur="indefinite" restart="never" nodeType="tmRoot"/>
+      </p:par>
+    </p:tnLst>
+  </p:timing>
 </p:sld>
 </file>
 
@@ -8824,11 +8822,23 @@
             </a:r>
             <a:r>
               <a:rPr lang="en-US" i="1" dirty="0" smtClean="0"/>
-              <a:t>Lecture Notes in Economics and Mathematical Systems Progress in Artificial Economics</a:t>
-            </a:r>
-            <a:r>
-              <a:rPr lang="en-US" dirty="0" smtClean="0"/>
-              <a:t>(2010): 215-26. Web. 15 June 2017.</a:t>
+              <a:t>Lecture Notes in Economics and Mathematical Systems Progress in </a:t>
+            </a:r>
+            <a:r>
+              <a:rPr lang="en-US" i="1" smtClean="0"/>
+              <a:t>Artificial </a:t>
+            </a:r>
+            <a:r>
+              <a:rPr lang="en-US" i="1" smtClean="0"/>
+              <a:t>Economics </a:t>
+            </a:r>
+            <a:r>
+              <a:rPr lang="en-US" smtClean="0"/>
+              <a:t>(</a:t>
+            </a:r>
+            <a:r>
+              <a:rPr lang="en-US" dirty="0" smtClean="0"/>
+              <a:t>2010): 215-26. Web. 15 June 2017.</a:t>
             </a:r>
           </a:p>
           <a:p>
@@ -9667,6 +9677,13 @@
   <p:clrMapOvr>
     <a:masterClrMapping/>
   </p:clrMapOvr>
+  <p:timing>
+    <p:tnLst>
+      <p:par>
+        <p:cTn id="1" dur="indefinite" restart="never" nodeType="tmRoot"/>
+      </p:par>
+    </p:tnLst>
+  </p:timing>
 </p:sld>
 </file>
 
@@ -11807,11 +11824,7 @@
           <a:p>
             <a:r>
               <a:rPr lang="en-US" dirty="0" smtClean="0"/>
-              <a:t>Systemic </a:t>
-            </a:r>
-            <a:r>
-              <a:rPr lang="en-US" dirty="0" smtClean="0"/>
-              <a:t>risk</a:t>
+              <a:t>Systemic risk</a:t>
             </a:r>
             <a:r>
               <a:rPr lang="en-US" baseline="30000" dirty="0" smtClean="0"/>

</xml_diff>